<commit_message>
more contents in ppt and revise critical error in analysis step
</commit_message>
<xml_diff>
--- a/Hotels in Madison Area.pptx
+++ b/Hotels in Madison Area.pptx
@@ -8,7 +8,11 @@
     <p:sldId id="256" r:id="rId2"/>
     <p:sldId id="257" r:id="rId3"/>
     <p:sldId id="259" r:id="rId4"/>
-    <p:sldId id="258" r:id="rId5"/>
+    <p:sldId id="260" r:id="rId5"/>
+    <p:sldId id="258" r:id="rId6"/>
+    <p:sldId id="261" r:id="rId7"/>
+    <p:sldId id="262" r:id="rId8"/>
+    <p:sldId id="263" r:id="rId9"/>
   </p:sldIdLst>
   <p:sldSz cx="12192000" cy="6858000"/>
   <p:notesSz cx="6858000" cy="9144000"/>
@@ -107,7 +111,38 @@
       </a:defRPr>
     </a:lvl9pPr>
   </p:defaultTextStyle>
+  <p:extLst>
+    <p:ext uri="{EFAFB233-063F-42B5-8137-9DF3F51BA10A}">
+      <p15:sldGuideLst xmlns:p15="http://schemas.microsoft.com/office/powerpoint/2012/main"/>
+    </p:ext>
+  </p:extLst>
 </p:presentation>
+</file>
+
+<file path=ppt/commentAuthors.xml><?xml version="1.0" encoding="utf-8"?>
+<p:cmAuthorLst xmlns:a="http://schemas.openxmlformats.org/drawingml/2006/main" xmlns:r="http://schemas.openxmlformats.org/officeDocument/2006/relationships" xmlns:p="http://schemas.openxmlformats.org/presentationml/2006/main">
+  <p:cmAuthor id="1" name="HanGyu KANG" initials="HK" lastIdx="1" clrIdx="0">
+    <p:extLst>
+      <p:ext uri="{19B8F6BF-5375-455C-9EA6-DF929625EA0E}">
+        <p15:presenceInfo xmlns:p15="http://schemas.microsoft.com/office/powerpoint/2012/main" userId="HanGyu KANG" providerId="None"/>
+      </p:ext>
+    </p:extLst>
+  </p:cmAuthor>
+</p:cmAuthorLst>
+</file>
+
+<file path=ppt/comments/comment1.xml><?xml version="1.0" encoding="utf-8"?>
+<p:cmLst xmlns:a="http://schemas.openxmlformats.org/drawingml/2006/main" xmlns:r="http://schemas.openxmlformats.org/officeDocument/2006/relationships" xmlns:p="http://schemas.openxmlformats.org/presentationml/2006/main">
+  <p:cm authorId="1" dt="2020-11-26T23:40:38.966" idx="1">
+    <p:pos x="10" y="10"/>
+    <p:text/>
+    <p:extLst>
+      <p:ext uri="{C676402C-5697-4E1C-873F-D02D1690AC5C}">
+        <p15:threadingInfo xmlns:p15="http://schemas.microsoft.com/office/powerpoint/2012/main" timeZoneBias="360"/>
+      </p:ext>
+    </p:extLst>
+  </p:cm>
+</p:cmLst>
 </file>
 
 <file path=ppt/slideLayouts/slideLayout1.xml><?xml version="1.0" encoding="utf-8"?>
@@ -3425,7 +3460,7 @@
         </p:nvSpPr>
         <p:spPr>
           <a:xfrm>
-            <a:off x="838200" y="170384"/>
+            <a:off x="838200" y="534456"/>
             <a:ext cx="10515600" cy="1325563"/>
           </a:xfrm>
         </p:spPr>
@@ -3458,7 +3493,7 @@
         </p:nvSpPr>
         <p:spPr>
           <a:xfrm>
-            <a:off x="838200" y="1253331"/>
+            <a:off x="838200" y="1795198"/>
             <a:ext cx="10515600" cy="3225536"/>
           </a:xfrm>
         </p:spPr>
@@ -3525,36 +3560,6 @@
           </a:p>
         </p:txBody>
       </p:sp>
-      <p:pic>
-        <p:nvPicPr>
-          <p:cNvPr id="6" name="Picture 5">
-            <a:extLst>
-              <a:ext uri="{FF2B5EF4-FFF2-40B4-BE49-F238E27FC236}">
-                <a16:creationId xmlns:a16="http://schemas.microsoft.com/office/drawing/2014/main" id="{F058E774-7C42-4A13-8FB2-21C006F9C996}"/>
-              </a:ext>
-            </a:extLst>
-          </p:cNvPr>
-          <p:cNvPicPr>
-            <a:picLocks noChangeAspect="1"/>
-          </p:cNvPicPr>
-          <p:nvPr/>
-        </p:nvPicPr>
-        <p:blipFill>
-          <a:blip r:embed="rId2"/>
-          <a:stretch>
-            <a:fillRect/>
-          </a:stretch>
-        </p:blipFill>
-        <p:spPr>
-          <a:xfrm>
-            <a:off x="6702041" y="4554102"/>
-            <a:ext cx="4029599" cy="1716070"/>
-          </a:xfrm>
-          <a:prstGeom prst="rect">
-            <a:avLst/>
-          </a:prstGeom>
-        </p:spPr>
-      </p:pic>
     </p:spTree>
     <p:extLst>
       <p:ext uri="{BB962C8B-B14F-4D97-AF65-F5344CB8AC3E}">
@@ -3762,38 +3767,358 @@
         </p:nvSpPr>
         <p:spPr/>
         <p:txBody>
-          <a:bodyPr/>
-          <a:lstStyle/>
-          <a:p>
+          <a:bodyPr>
+            <a:normAutofit/>
+          </a:bodyPr>
+          <a:lstStyle/>
+          <a:p>
+            <a:r>
+              <a:rPr lang="en-US" sz="3600" dirty="0"/>
+              <a:t>Data Analysis Process (Manipulating Cleaned Dataset)</a:t>
+            </a:r>
+          </a:p>
+        </p:txBody>
+      </p:sp>
+      <p:pic>
+        <p:nvPicPr>
+          <p:cNvPr id="4" name="Picture 3">
+            <a:extLst>
+              <a:ext uri="{FF2B5EF4-FFF2-40B4-BE49-F238E27FC236}">
+                <a16:creationId xmlns:a16="http://schemas.microsoft.com/office/drawing/2014/main" id="{EF592FD3-22FA-4B99-81B5-90811D72F947}"/>
+              </a:ext>
+            </a:extLst>
+          </p:cNvPr>
+          <p:cNvPicPr>
+            <a:picLocks noChangeAspect="1"/>
+          </p:cNvPicPr>
+          <p:nvPr/>
+        </p:nvPicPr>
+        <p:blipFill>
+          <a:blip r:embed="rId2"/>
+          <a:stretch>
+            <a:fillRect/>
+          </a:stretch>
+        </p:blipFill>
+        <p:spPr>
+          <a:xfrm>
+            <a:off x="838200" y="1419382"/>
+            <a:ext cx="8299363" cy="2790877"/>
+          </a:xfrm>
+          <a:prstGeom prst="rect">
+            <a:avLst/>
+          </a:prstGeom>
+        </p:spPr>
+      </p:pic>
+      <p:sp>
+        <p:nvSpPr>
+          <p:cNvPr id="6" name="Content Placeholder 5">
+            <a:extLst>
+              <a:ext uri="{FF2B5EF4-FFF2-40B4-BE49-F238E27FC236}">
+                <a16:creationId xmlns:a16="http://schemas.microsoft.com/office/drawing/2014/main" id="{CD1678C4-48FF-4118-A818-91AD1E08575A}"/>
+              </a:ext>
+            </a:extLst>
+          </p:cNvPr>
+          <p:cNvSpPr>
+            <a:spLocks noGrp="1"/>
+          </p:cNvSpPr>
+          <p:nvPr>
+            <p:ph idx="1"/>
+          </p:nvPr>
+        </p:nvSpPr>
+        <p:spPr>
+          <a:xfrm>
+            <a:off x="838200" y="4372165"/>
+            <a:ext cx="10114503" cy="2038683"/>
+          </a:xfrm>
+        </p:spPr>
+        <p:txBody>
+          <a:bodyPr>
+            <a:normAutofit/>
+          </a:bodyPr>
+          <a:lstStyle/>
+          <a:p>
+            <a:pPr marL="0" indent="0">
+              <a:buNone/>
+            </a:pPr>
             <a:r>
               <a:rPr lang="en-US" dirty="0"/>
-              <a:t>Data Analysis Process</a:t>
-            </a:r>
-          </a:p>
-        </p:txBody>
-      </p:sp>
-      <p:sp>
-        <p:nvSpPr>
-          <p:cNvPr id="3" name="Content Placeholder 2">
-            <a:extLst>
-              <a:ext uri="{FF2B5EF4-FFF2-40B4-BE49-F238E27FC236}">
-                <a16:creationId xmlns:a16="http://schemas.microsoft.com/office/drawing/2014/main" id="{8BA08ECA-E81A-4A3B-A287-8E2D97F5B3A8}"/>
-              </a:ext>
-            </a:extLst>
-          </p:cNvPr>
-          <p:cNvSpPr>
-            <a:spLocks noGrp="1"/>
-          </p:cNvSpPr>
-          <p:nvPr>
-            <p:ph idx="1"/>
+              <a:t>1532 x 1405</a:t>
+            </a:r>
+          </a:p>
+          <a:p>
+            <a:pPr marL="0" indent="0">
+              <a:buNone/>
+            </a:pPr>
+            <a:r>
+              <a:rPr lang="en-US" dirty="0"/>
+              <a:t>1532 rows =&gt; reviews about hotels in Madison</a:t>
+            </a:r>
+          </a:p>
+          <a:p>
+            <a:pPr marL="0" indent="0">
+              <a:buNone/>
+            </a:pPr>
+            <a:r>
+              <a:rPr lang="en-US" dirty="0"/>
+              <a:t>1395 columns =&gt; Word Frequency</a:t>
+            </a:r>
+          </a:p>
+          <a:p>
+            <a:pPr marL="0" indent="0">
+              <a:buNone/>
+            </a:pPr>
+            <a:r>
+              <a:rPr lang="en-US" dirty="0"/>
+              <a:t>10 columns =&gt; About business </a:t>
+            </a:r>
+          </a:p>
+          <a:p>
+            <a:pPr marL="0" indent="0">
+              <a:buNone/>
+            </a:pPr>
+            <a:endParaRPr lang="en-US" dirty="0"/>
+          </a:p>
+        </p:txBody>
+      </p:sp>
+    </p:spTree>
+    <p:extLst>
+      <p:ext uri="{BB962C8B-B14F-4D97-AF65-F5344CB8AC3E}">
+        <p14:creationId xmlns:p14="http://schemas.microsoft.com/office/powerpoint/2010/main" val="4012451063"/>
+      </p:ext>
+    </p:extLst>
+  </p:cSld>
+  <p:clrMapOvr>
+    <a:masterClrMapping/>
+  </p:clrMapOvr>
+</p:sld>
+</file>
+
+<file path=ppt/slides/slide5.xml><?xml version="1.0" encoding="utf-8"?>
+<p:sld xmlns:a="http://schemas.openxmlformats.org/drawingml/2006/main" xmlns:r="http://schemas.openxmlformats.org/officeDocument/2006/relationships" xmlns:p="http://schemas.openxmlformats.org/presentationml/2006/main">
+  <p:cSld>
+    <p:spTree>
+      <p:nvGrpSpPr>
+        <p:cNvPr id="1" name=""/>
+        <p:cNvGrpSpPr/>
+        <p:nvPr/>
+      </p:nvGrpSpPr>
+      <p:grpSpPr>
+        <a:xfrm>
+          <a:off x="0" y="0"/>
+          <a:ext cx="0" cy="0"/>
+          <a:chOff x="0" y="0"/>
+          <a:chExt cx="0" cy="0"/>
+        </a:xfrm>
+      </p:grpSpPr>
+      <p:sp>
+        <p:nvSpPr>
+          <p:cNvPr id="2" name="Title 1">
+            <a:extLst>
+              <a:ext uri="{FF2B5EF4-FFF2-40B4-BE49-F238E27FC236}">
+                <a16:creationId xmlns:a16="http://schemas.microsoft.com/office/drawing/2014/main" id="{417E78FE-553A-426A-9575-6CD0E7C8D12E}"/>
+              </a:ext>
+            </a:extLst>
+          </p:cNvPr>
+          <p:cNvSpPr>
+            <a:spLocks noGrp="1"/>
+          </p:cNvSpPr>
+          <p:nvPr>
+            <p:ph type="title"/>
           </p:nvPr>
         </p:nvSpPr>
         <p:spPr/>
         <p:txBody>
-          <a:bodyPr/>
-          <a:lstStyle/>
-          <a:p>
+          <a:bodyPr>
+            <a:normAutofit/>
+          </a:bodyPr>
+          <a:lstStyle/>
+          <a:p>
+            <a:r>
+              <a:rPr lang="en-US" sz="3600" dirty="0"/>
+              <a:t>Data Analysis Process (Manipulating Cleaned Dataset)</a:t>
+            </a:r>
+          </a:p>
+        </p:txBody>
+      </p:sp>
+      <p:pic>
+        <p:nvPicPr>
+          <p:cNvPr id="4" name="Picture 3">
+            <a:extLst>
+              <a:ext uri="{FF2B5EF4-FFF2-40B4-BE49-F238E27FC236}">
+                <a16:creationId xmlns:a16="http://schemas.microsoft.com/office/drawing/2014/main" id="{EF592FD3-22FA-4B99-81B5-90811D72F947}"/>
+              </a:ext>
+            </a:extLst>
+          </p:cNvPr>
+          <p:cNvPicPr>
+            <a:picLocks noChangeAspect="1"/>
+          </p:cNvPicPr>
+          <p:nvPr/>
+        </p:nvPicPr>
+        <p:blipFill>
+          <a:blip r:embed="rId2"/>
+          <a:stretch>
+            <a:fillRect/>
+          </a:stretch>
+        </p:blipFill>
+        <p:spPr>
+          <a:xfrm>
+            <a:off x="838201" y="1419382"/>
+            <a:ext cx="6832140" cy="2297485"/>
+          </a:xfrm>
+          <a:prstGeom prst="rect">
+            <a:avLst/>
+          </a:prstGeom>
+        </p:spPr>
+      </p:pic>
+      <p:pic>
+        <p:nvPicPr>
+          <p:cNvPr id="8" name="Picture 7">
+            <a:extLst>
+              <a:ext uri="{FF2B5EF4-FFF2-40B4-BE49-F238E27FC236}">
+                <a16:creationId xmlns:a16="http://schemas.microsoft.com/office/drawing/2014/main" id="{3F9DF906-5E10-44C9-81D0-C25915AB58E2}"/>
+              </a:ext>
+            </a:extLst>
+          </p:cNvPr>
+          <p:cNvPicPr>
+            <a:picLocks noChangeAspect="1"/>
+          </p:cNvPicPr>
+          <p:nvPr/>
+        </p:nvPicPr>
+        <p:blipFill>
+          <a:blip r:embed="rId3"/>
+          <a:stretch>
+            <a:fillRect/>
+          </a:stretch>
+        </p:blipFill>
+        <p:spPr>
+          <a:xfrm>
+            <a:off x="1183217" y="4042461"/>
+            <a:ext cx="9334500" cy="1457325"/>
+          </a:xfrm>
+          <a:prstGeom prst="rect">
+            <a:avLst/>
+          </a:prstGeom>
+        </p:spPr>
+      </p:pic>
+      <p:sp>
+        <p:nvSpPr>
+          <p:cNvPr id="9" name="Arrow: Right 8">
+            <a:extLst>
+              <a:ext uri="{FF2B5EF4-FFF2-40B4-BE49-F238E27FC236}">
+                <a16:creationId xmlns:a16="http://schemas.microsoft.com/office/drawing/2014/main" id="{6D82207A-2EE6-40C4-978C-7FD6C79FB29D}"/>
+              </a:ext>
+            </a:extLst>
+          </p:cNvPr>
+          <p:cNvSpPr/>
+          <p:nvPr/>
+        </p:nvSpPr>
+        <p:spPr>
+          <a:xfrm>
+            <a:off x="9417820" y="2563189"/>
+            <a:ext cx="813917" cy="403155"/>
+          </a:xfrm>
+          <a:prstGeom prst="rightArrow">
+            <a:avLst/>
+          </a:prstGeom>
+        </p:spPr>
+        <p:style>
+          <a:lnRef idx="2">
+            <a:schemeClr val="accent1">
+              <a:shade val="50000"/>
+            </a:schemeClr>
+          </a:lnRef>
+          <a:fillRef idx="1">
+            <a:schemeClr val="accent1"/>
+          </a:fillRef>
+          <a:effectRef idx="0">
+            <a:schemeClr val="accent1"/>
+          </a:effectRef>
+          <a:fontRef idx="minor">
+            <a:schemeClr val="lt1"/>
+          </a:fontRef>
+        </p:style>
+        <p:txBody>
+          <a:bodyPr rtlCol="0" anchor="ctr"/>
+          <a:lstStyle/>
+          <a:p>
+            <a:pPr algn="ctr"/>
             <a:endParaRPr lang="en-US"/>
+          </a:p>
+        </p:txBody>
+      </p:sp>
+      <p:sp>
+        <p:nvSpPr>
+          <p:cNvPr id="11" name="TextBox 10">
+            <a:extLst>
+              <a:ext uri="{FF2B5EF4-FFF2-40B4-BE49-F238E27FC236}">
+                <a16:creationId xmlns:a16="http://schemas.microsoft.com/office/drawing/2014/main" id="{F1553CD4-08A5-41CC-954D-F46D4EA97AB3}"/>
+              </a:ext>
+            </a:extLst>
+          </p:cNvPr>
+          <p:cNvSpPr txBox="1"/>
+          <p:nvPr/>
+        </p:nvSpPr>
+        <p:spPr>
+          <a:xfrm>
+            <a:off x="7841347" y="2580101"/>
+            <a:ext cx="1405467" cy="369332"/>
+          </a:xfrm>
+          <a:prstGeom prst="rect">
+            <a:avLst/>
+          </a:prstGeom>
+          <a:noFill/>
+        </p:spPr>
+        <p:txBody>
+          <a:bodyPr wrap="square">
+            <a:spAutoFit/>
+          </a:bodyPr>
+          <a:lstStyle/>
+          <a:p>
+            <a:pPr marL="0" indent="0">
+              <a:buNone/>
+            </a:pPr>
+            <a:r>
+              <a:rPr lang="en-US" dirty="0"/>
+              <a:t>1532 x 1405</a:t>
+            </a:r>
+          </a:p>
+        </p:txBody>
+      </p:sp>
+      <p:sp>
+        <p:nvSpPr>
+          <p:cNvPr id="12" name="TextBox 11">
+            <a:extLst>
+              <a:ext uri="{FF2B5EF4-FFF2-40B4-BE49-F238E27FC236}">
+                <a16:creationId xmlns:a16="http://schemas.microsoft.com/office/drawing/2014/main" id="{4F18319E-A791-4F2A-8BD8-1A6F56EC1DE7}"/>
+              </a:ext>
+            </a:extLst>
+          </p:cNvPr>
+          <p:cNvSpPr txBox="1"/>
+          <p:nvPr/>
+        </p:nvSpPr>
+        <p:spPr>
+          <a:xfrm>
+            <a:off x="5147733" y="5699308"/>
+            <a:ext cx="1405467" cy="369332"/>
+          </a:xfrm>
+          <a:prstGeom prst="rect">
+            <a:avLst/>
+          </a:prstGeom>
+          <a:noFill/>
+        </p:spPr>
+        <p:txBody>
+          <a:bodyPr wrap="square">
+            <a:spAutoFit/>
+          </a:bodyPr>
+          <a:lstStyle/>
+          <a:p>
+            <a:pPr marL="0" indent="0">
+              <a:buNone/>
+            </a:pPr>
+            <a:r>
+              <a:rPr lang="en-US" dirty="0"/>
+              <a:t>1532 x 344</a:t>
+            </a:r>
           </a:p>
         </p:txBody>
       </p:sp>
@@ -3801,6 +4126,1142 @@
     <p:extLst>
       <p:ext uri="{BB962C8B-B14F-4D97-AF65-F5344CB8AC3E}">
         <p14:creationId xmlns:p14="http://schemas.microsoft.com/office/powerpoint/2010/main" val="3050738572"/>
+      </p:ext>
+    </p:extLst>
+  </p:cSld>
+  <p:clrMapOvr>
+    <a:masterClrMapping/>
+  </p:clrMapOvr>
+</p:sld>
+</file>
+
+<file path=ppt/slides/slide6.xml><?xml version="1.0" encoding="utf-8"?>
+<p:sld xmlns:a="http://schemas.openxmlformats.org/drawingml/2006/main" xmlns:r="http://schemas.openxmlformats.org/officeDocument/2006/relationships" xmlns:p="http://schemas.openxmlformats.org/presentationml/2006/main">
+  <p:cSld>
+    <p:spTree>
+      <p:nvGrpSpPr>
+        <p:cNvPr id="1" name=""/>
+        <p:cNvGrpSpPr/>
+        <p:nvPr/>
+      </p:nvGrpSpPr>
+      <p:grpSpPr>
+        <a:xfrm>
+          <a:off x="0" y="0"/>
+          <a:ext cx="0" cy="0"/>
+          <a:chOff x="0" y="0"/>
+          <a:chExt cx="0" cy="0"/>
+        </a:xfrm>
+      </p:grpSpPr>
+      <p:sp>
+        <p:nvSpPr>
+          <p:cNvPr id="2" name="Title 1">
+            <a:extLst>
+              <a:ext uri="{FF2B5EF4-FFF2-40B4-BE49-F238E27FC236}">
+                <a16:creationId xmlns:a16="http://schemas.microsoft.com/office/drawing/2014/main" id="{417E78FE-553A-426A-9575-6CD0E7C8D12E}"/>
+              </a:ext>
+            </a:extLst>
+          </p:cNvPr>
+          <p:cNvSpPr>
+            <a:spLocks noGrp="1"/>
+          </p:cNvSpPr>
+          <p:nvPr>
+            <p:ph type="title"/>
+          </p:nvPr>
+        </p:nvSpPr>
+        <p:spPr/>
+        <p:txBody>
+          <a:bodyPr>
+            <a:normAutofit/>
+          </a:bodyPr>
+          <a:lstStyle/>
+          <a:p>
+            <a:r>
+              <a:rPr lang="en-US" sz="3600" dirty="0"/>
+              <a:t>Data Analysis Process (Manipulating Cleaned Dataset)</a:t>
+            </a:r>
+          </a:p>
+        </p:txBody>
+      </p:sp>
+      <p:sp>
+        <p:nvSpPr>
+          <p:cNvPr id="9" name="Arrow: Right 8">
+            <a:extLst>
+              <a:ext uri="{FF2B5EF4-FFF2-40B4-BE49-F238E27FC236}">
+                <a16:creationId xmlns:a16="http://schemas.microsoft.com/office/drawing/2014/main" id="{6D82207A-2EE6-40C4-978C-7FD6C79FB29D}"/>
+              </a:ext>
+            </a:extLst>
+          </p:cNvPr>
+          <p:cNvSpPr/>
+          <p:nvPr/>
+        </p:nvSpPr>
+        <p:spPr>
+          <a:xfrm>
+            <a:off x="4845998" y="1547621"/>
+            <a:ext cx="813917" cy="403155"/>
+          </a:xfrm>
+          <a:prstGeom prst="rightArrow">
+            <a:avLst/>
+          </a:prstGeom>
+        </p:spPr>
+        <p:style>
+          <a:lnRef idx="2">
+            <a:schemeClr val="accent1">
+              <a:shade val="50000"/>
+            </a:schemeClr>
+          </a:lnRef>
+          <a:fillRef idx="1">
+            <a:schemeClr val="accent1"/>
+          </a:fillRef>
+          <a:effectRef idx="0">
+            <a:schemeClr val="accent1"/>
+          </a:effectRef>
+          <a:fontRef idx="minor">
+            <a:schemeClr val="lt1"/>
+          </a:fontRef>
+        </p:style>
+        <p:txBody>
+          <a:bodyPr rtlCol="0" anchor="ctr"/>
+          <a:lstStyle/>
+          <a:p>
+            <a:pPr algn="ctr"/>
+            <a:endParaRPr lang="en-US"/>
+          </a:p>
+        </p:txBody>
+      </p:sp>
+      <p:sp>
+        <p:nvSpPr>
+          <p:cNvPr id="11" name="TextBox 10">
+            <a:extLst>
+              <a:ext uri="{FF2B5EF4-FFF2-40B4-BE49-F238E27FC236}">
+                <a16:creationId xmlns:a16="http://schemas.microsoft.com/office/drawing/2014/main" id="{F1553CD4-08A5-41CC-954D-F46D4EA97AB3}"/>
+              </a:ext>
+            </a:extLst>
+          </p:cNvPr>
+          <p:cNvSpPr txBox="1"/>
+          <p:nvPr/>
+        </p:nvSpPr>
+        <p:spPr>
+          <a:xfrm>
+            <a:off x="1931614" y="1615267"/>
+            <a:ext cx="1405467" cy="369332"/>
+          </a:xfrm>
+          <a:prstGeom prst="rect">
+            <a:avLst/>
+          </a:prstGeom>
+          <a:noFill/>
+        </p:spPr>
+        <p:txBody>
+          <a:bodyPr wrap="square">
+            <a:spAutoFit/>
+          </a:bodyPr>
+          <a:lstStyle/>
+          <a:p>
+            <a:pPr marL="0" indent="0">
+              <a:buNone/>
+            </a:pPr>
+            <a:r>
+              <a:rPr lang="en-US" dirty="0"/>
+              <a:t>1532 x 1405</a:t>
+            </a:r>
+          </a:p>
+        </p:txBody>
+      </p:sp>
+      <p:sp>
+        <p:nvSpPr>
+          <p:cNvPr id="12" name="TextBox 11">
+            <a:extLst>
+              <a:ext uri="{FF2B5EF4-FFF2-40B4-BE49-F238E27FC236}">
+                <a16:creationId xmlns:a16="http://schemas.microsoft.com/office/drawing/2014/main" id="{4F18319E-A791-4F2A-8BD8-1A6F56EC1DE7}"/>
+              </a:ext>
+            </a:extLst>
+          </p:cNvPr>
+          <p:cNvSpPr txBox="1"/>
+          <p:nvPr/>
+        </p:nvSpPr>
+        <p:spPr>
+          <a:xfrm>
+            <a:off x="6255650" y="1581444"/>
+            <a:ext cx="1405467" cy="369332"/>
+          </a:xfrm>
+          <a:prstGeom prst="rect">
+            <a:avLst/>
+          </a:prstGeom>
+          <a:noFill/>
+        </p:spPr>
+        <p:txBody>
+          <a:bodyPr wrap="square">
+            <a:spAutoFit/>
+          </a:bodyPr>
+          <a:lstStyle/>
+          <a:p>
+            <a:pPr marL="0" indent="0">
+              <a:buNone/>
+            </a:pPr>
+            <a:r>
+              <a:rPr lang="en-US" dirty="0"/>
+              <a:t>1532 x 344</a:t>
+            </a:r>
+          </a:p>
+        </p:txBody>
+      </p:sp>
+      <p:pic>
+        <p:nvPicPr>
+          <p:cNvPr id="5" name="Picture 4">
+            <a:extLst>
+              <a:ext uri="{FF2B5EF4-FFF2-40B4-BE49-F238E27FC236}">
+                <a16:creationId xmlns:a16="http://schemas.microsoft.com/office/drawing/2014/main" id="{40444E67-5DCD-4264-93E8-BD9F4D3C9936}"/>
+              </a:ext>
+            </a:extLst>
+          </p:cNvPr>
+          <p:cNvPicPr>
+            <a:picLocks noChangeAspect="1"/>
+          </p:cNvPicPr>
+          <p:nvPr/>
+        </p:nvPicPr>
+        <p:blipFill>
+          <a:blip r:embed="rId2"/>
+          <a:stretch>
+            <a:fillRect/>
+          </a:stretch>
+        </p:blipFill>
+        <p:spPr>
+          <a:xfrm>
+            <a:off x="1684870" y="3529876"/>
+            <a:ext cx="6822917" cy="1996439"/>
+          </a:xfrm>
+          <a:prstGeom prst="rect">
+            <a:avLst/>
+          </a:prstGeom>
+        </p:spPr>
+      </p:pic>
+      <p:sp>
+        <p:nvSpPr>
+          <p:cNvPr id="6" name="TextBox 5">
+            <a:extLst>
+              <a:ext uri="{FF2B5EF4-FFF2-40B4-BE49-F238E27FC236}">
+                <a16:creationId xmlns:a16="http://schemas.microsoft.com/office/drawing/2014/main" id="{BFE11F84-790A-489E-8B4F-48B46E920277}"/>
+              </a:ext>
+            </a:extLst>
+          </p:cNvPr>
+          <p:cNvSpPr txBox="1"/>
+          <p:nvPr/>
+        </p:nvSpPr>
+        <p:spPr>
+          <a:xfrm>
+            <a:off x="3089116" y="3171945"/>
+            <a:ext cx="4361551" cy="369332"/>
+          </a:xfrm>
+          <a:prstGeom prst="rect">
+            <a:avLst/>
+          </a:prstGeom>
+          <a:noFill/>
+        </p:spPr>
+        <p:txBody>
+          <a:bodyPr wrap="square" rtlCol="0">
+            <a:spAutoFit/>
+          </a:bodyPr>
+          <a:lstStyle/>
+          <a:p>
+            <a:r>
+              <a:rPr lang="en-US" dirty="0"/>
+              <a:t>First, we reduced the overlapping count to 1 </a:t>
+            </a:r>
+          </a:p>
+        </p:txBody>
+      </p:sp>
+      <p:pic>
+        <p:nvPicPr>
+          <p:cNvPr id="14" name="Picture 13">
+            <a:extLst>
+              <a:ext uri="{FF2B5EF4-FFF2-40B4-BE49-F238E27FC236}">
+                <a16:creationId xmlns:a16="http://schemas.microsoft.com/office/drawing/2014/main" id="{98EC555C-A2EC-4C0F-9BEC-EA7E209BDCB3}"/>
+              </a:ext>
+            </a:extLst>
+          </p:cNvPr>
+          <p:cNvPicPr>
+            <a:picLocks noChangeAspect="1"/>
+          </p:cNvPicPr>
+          <p:nvPr/>
+        </p:nvPicPr>
+        <p:blipFill>
+          <a:blip r:embed="rId3"/>
+          <a:stretch>
+            <a:fillRect/>
+          </a:stretch>
+        </p:blipFill>
+        <p:spPr>
+          <a:xfrm>
+            <a:off x="1231899" y="2079206"/>
+            <a:ext cx="3124200" cy="981075"/>
+          </a:xfrm>
+          <a:prstGeom prst="rect">
+            <a:avLst/>
+          </a:prstGeom>
+        </p:spPr>
+      </p:pic>
+      <p:pic>
+        <p:nvPicPr>
+          <p:cNvPr id="16" name="Picture 15">
+            <a:extLst>
+              <a:ext uri="{FF2B5EF4-FFF2-40B4-BE49-F238E27FC236}">
+                <a16:creationId xmlns:a16="http://schemas.microsoft.com/office/drawing/2014/main" id="{CCF3F9AC-EB5A-4BCF-ACB5-43D57A0B2407}"/>
+              </a:ext>
+            </a:extLst>
+          </p:cNvPr>
+          <p:cNvPicPr>
+            <a:picLocks noChangeAspect="1"/>
+          </p:cNvPicPr>
+          <p:nvPr/>
+        </p:nvPicPr>
+        <p:blipFill>
+          <a:blip r:embed="rId4"/>
+          <a:stretch>
+            <a:fillRect/>
+          </a:stretch>
+        </p:blipFill>
+        <p:spPr>
+          <a:xfrm>
+            <a:off x="5746592" y="2098980"/>
+            <a:ext cx="3829050" cy="1000125"/>
+          </a:xfrm>
+          <a:prstGeom prst="rect">
+            <a:avLst/>
+          </a:prstGeom>
+        </p:spPr>
+      </p:pic>
+      <p:sp>
+        <p:nvSpPr>
+          <p:cNvPr id="17" name="TextBox 16">
+            <a:extLst>
+              <a:ext uri="{FF2B5EF4-FFF2-40B4-BE49-F238E27FC236}">
+                <a16:creationId xmlns:a16="http://schemas.microsoft.com/office/drawing/2014/main" id="{C42F2419-2BA6-4F17-8305-A445ADC31840}"/>
+              </a:ext>
+            </a:extLst>
+          </p:cNvPr>
+          <p:cNvSpPr txBox="1"/>
+          <p:nvPr/>
+        </p:nvSpPr>
+        <p:spPr>
+          <a:xfrm>
+            <a:off x="2106983" y="5535847"/>
+            <a:ext cx="6822917" cy="646331"/>
+          </a:xfrm>
+          <a:prstGeom prst="rect">
+            <a:avLst/>
+          </a:prstGeom>
+          <a:noFill/>
+        </p:spPr>
+        <p:txBody>
+          <a:bodyPr wrap="square" rtlCol="0">
+            <a:spAutoFit/>
+          </a:bodyPr>
+          <a:lstStyle/>
+          <a:p>
+            <a:r>
+              <a:rPr lang="en-US" dirty="0"/>
+              <a:t>Second, we removed unmeaningful words, by selected out the words more used than 3</a:t>
+            </a:r>
+            <a:r>
+              <a:rPr lang="en-US" baseline="30000" dirty="0"/>
+              <a:t>rd</a:t>
+            </a:r>
+            <a:r>
+              <a:rPr lang="en-US" dirty="0"/>
+              <a:t> quantile()reduced the repeated count to 1 </a:t>
+            </a:r>
+          </a:p>
+        </p:txBody>
+      </p:sp>
+      <p:pic>
+        <p:nvPicPr>
+          <p:cNvPr id="19" name="Picture 18">
+            <a:extLst>
+              <a:ext uri="{FF2B5EF4-FFF2-40B4-BE49-F238E27FC236}">
+                <a16:creationId xmlns:a16="http://schemas.microsoft.com/office/drawing/2014/main" id="{4512867E-10FB-451A-AF5B-93DCB7F02CFE}"/>
+              </a:ext>
+            </a:extLst>
+          </p:cNvPr>
+          <p:cNvPicPr>
+            <a:picLocks noChangeAspect="1"/>
+          </p:cNvPicPr>
+          <p:nvPr/>
+        </p:nvPicPr>
+        <p:blipFill>
+          <a:blip r:embed="rId5"/>
+          <a:stretch>
+            <a:fillRect/>
+          </a:stretch>
+        </p:blipFill>
+        <p:spPr>
+          <a:xfrm>
+            <a:off x="3793484" y="6134882"/>
+            <a:ext cx="3019425" cy="361950"/>
+          </a:xfrm>
+          <a:prstGeom prst="rect">
+            <a:avLst/>
+          </a:prstGeom>
+        </p:spPr>
+      </p:pic>
+    </p:spTree>
+    <p:extLst>
+      <p:ext uri="{BB962C8B-B14F-4D97-AF65-F5344CB8AC3E}">
+        <p14:creationId xmlns:p14="http://schemas.microsoft.com/office/powerpoint/2010/main" val="981964778"/>
+      </p:ext>
+    </p:extLst>
+  </p:cSld>
+  <p:clrMapOvr>
+    <a:masterClrMapping/>
+  </p:clrMapOvr>
+</p:sld>
+</file>
+
+<file path=ppt/slides/slide7.xml><?xml version="1.0" encoding="utf-8"?>
+<p:sld xmlns:a="http://schemas.openxmlformats.org/drawingml/2006/main" xmlns:r="http://schemas.openxmlformats.org/officeDocument/2006/relationships" xmlns:p="http://schemas.openxmlformats.org/presentationml/2006/main">
+  <p:cSld>
+    <p:spTree>
+      <p:nvGrpSpPr>
+        <p:cNvPr id="1" name=""/>
+        <p:cNvGrpSpPr/>
+        <p:nvPr/>
+      </p:nvGrpSpPr>
+      <p:grpSpPr>
+        <a:xfrm>
+          <a:off x="0" y="0"/>
+          <a:ext cx="0" cy="0"/>
+          <a:chOff x="0" y="0"/>
+          <a:chExt cx="0" cy="0"/>
+        </a:xfrm>
+      </p:grpSpPr>
+      <p:sp>
+        <p:nvSpPr>
+          <p:cNvPr id="2" name="Title 1">
+            <a:extLst>
+              <a:ext uri="{FF2B5EF4-FFF2-40B4-BE49-F238E27FC236}">
+                <a16:creationId xmlns:a16="http://schemas.microsoft.com/office/drawing/2014/main" id="{417E78FE-553A-426A-9575-6CD0E7C8D12E}"/>
+              </a:ext>
+            </a:extLst>
+          </p:cNvPr>
+          <p:cNvSpPr>
+            <a:spLocks noGrp="1"/>
+          </p:cNvSpPr>
+          <p:nvPr>
+            <p:ph type="title"/>
+          </p:nvPr>
+        </p:nvSpPr>
+        <p:spPr/>
+        <p:txBody>
+          <a:bodyPr>
+            <a:normAutofit/>
+          </a:bodyPr>
+          <a:lstStyle/>
+          <a:p>
+            <a:r>
+              <a:rPr lang="en-US" sz="3600" dirty="0"/>
+              <a:t>Data Analysis Process (EDA)</a:t>
+            </a:r>
+          </a:p>
+        </p:txBody>
+      </p:sp>
+      <p:pic>
+        <p:nvPicPr>
+          <p:cNvPr id="8" name="Picture 7">
+            <a:extLst>
+              <a:ext uri="{FF2B5EF4-FFF2-40B4-BE49-F238E27FC236}">
+                <a16:creationId xmlns:a16="http://schemas.microsoft.com/office/drawing/2014/main" id="{1E8CB853-3FBA-4A3C-9E88-F9BC5DD9C65E}"/>
+              </a:ext>
+            </a:extLst>
+          </p:cNvPr>
+          <p:cNvPicPr>
+            <a:picLocks noChangeAspect="1"/>
+          </p:cNvPicPr>
+          <p:nvPr/>
+        </p:nvPicPr>
+        <p:blipFill>
+          <a:blip r:embed="rId2"/>
+          <a:stretch>
+            <a:fillRect/>
+          </a:stretch>
+        </p:blipFill>
+        <p:spPr>
+          <a:xfrm>
+            <a:off x="973192" y="1534319"/>
+            <a:ext cx="4400567" cy="2873430"/>
+          </a:xfrm>
+          <a:prstGeom prst="rect">
+            <a:avLst/>
+          </a:prstGeom>
+        </p:spPr>
+      </p:pic>
+      <p:sp>
+        <p:nvSpPr>
+          <p:cNvPr id="22" name="TextBox 21">
+            <a:extLst>
+              <a:ext uri="{FF2B5EF4-FFF2-40B4-BE49-F238E27FC236}">
+                <a16:creationId xmlns:a16="http://schemas.microsoft.com/office/drawing/2014/main" id="{6BE5B367-108E-4F3D-BF48-E78804C14058}"/>
+              </a:ext>
+            </a:extLst>
+          </p:cNvPr>
+          <p:cNvSpPr txBox="1"/>
+          <p:nvPr/>
+        </p:nvSpPr>
+        <p:spPr>
+          <a:xfrm>
+            <a:off x="6480044" y="1320353"/>
+            <a:ext cx="4542181" cy="369332"/>
+          </a:xfrm>
+          <a:prstGeom prst="rect">
+            <a:avLst/>
+          </a:prstGeom>
+          <a:noFill/>
+        </p:spPr>
+        <p:txBody>
+          <a:bodyPr wrap="square" rtlCol="0">
+            <a:spAutoFit/>
+          </a:bodyPr>
+          <a:lstStyle/>
+          <a:p>
+            <a:r>
+              <a:rPr lang="en-US" dirty="0"/>
+              <a:t>1. Words associated with service and furniture</a:t>
+            </a:r>
+          </a:p>
+        </p:txBody>
+      </p:sp>
+      <p:sp>
+        <p:nvSpPr>
+          <p:cNvPr id="23" name="TextBox 22">
+            <a:extLst>
+              <a:ext uri="{FF2B5EF4-FFF2-40B4-BE49-F238E27FC236}">
+                <a16:creationId xmlns:a16="http://schemas.microsoft.com/office/drawing/2014/main" id="{600D631E-83FD-44B9-8A55-C4E2B03F3B26}"/>
+              </a:ext>
+            </a:extLst>
+          </p:cNvPr>
+          <p:cNvSpPr txBox="1"/>
+          <p:nvPr/>
+        </p:nvSpPr>
+        <p:spPr>
+          <a:xfrm>
+            <a:off x="6480045" y="2878139"/>
+            <a:ext cx="3577818" cy="369332"/>
+          </a:xfrm>
+          <a:prstGeom prst="rect">
+            <a:avLst/>
+          </a:prstGeom>
+          <a:noFill/>
+        </p:spPr>
+        <p:txBody>
+          <a:bodyPr wrap="square" rtlCol="0">
+            <a:spAutoFit/>
+          </a:bodyPr>
+          <a:lstStyle/>
+          <a:p>
+            <a:r>
+              <a:rPr lang="en-US" dirty="0"/>
+              <a:t>2. Words associated with facility</a:t>
+            </a:r>
+          </a:p>
+        </p:txBody>
+      </p:sp>
+      <p:sp>
+        <p:nvSpPr>
+          <p:cNvPr id="24" name="TextBox 23">
+            <a:extLst>
+              <a:ext uri="{FF2B5EF4-FFF2-40B4-BE49-F238E27FC236}">
+                <a16:creationId xmlns:a16="http://schemas.microsoft.com/office/drawing/2014/main" id="{CA75F733-33E9-49E0-87F1-2AB4E5D66952}"/>
+              </a:ext>
+            </a:extLst>
+          </p:cNvPr>
+          <p:cNvSpPr txBox="1"/>
+          <p:nvPr/>
+        </p:nvSpPr>
+        <p:spPr>
+          <a:xfrm>
+            <a:off x="6480045" y="4223083"/>
+            <a:ext cx="3577818" cy="369332"/>
+          </a:xfrm>
+          <a:prstGeom prst="rect">
+            <a:avLst/>
+          </a:prstGeom>
+          <a:noFill/>
+        </p:spPr>
+        <p:txBody>
+          <a:bodyPr wrap="square" rtlCol="0">
+            <a:spAutoFit/>
+          </a:bodyPr>
+          <a:lstStyle/>
+          <a:p>
+            <a:r>
+              <a:rPr lang="en-US" dirty="0"/>
+              <a:t>3. Words associated with location</a:t>
+            </a:r>
+          </a:p>
+        </p:txBody>
+      </p:sp>
+      <p:sp>
+        <p:nvSpPr>
+          <p:cNvPr id="25" name="TextBox 24">
+            <a:extLst>
+              <a:ext uri="{FF2B5EF4-FFF2-40B4-BE49-F238E27FC236}">
+                <a16:creationId xmlns:a16="http://schemas.microsoft.com/office/drawing/2014/main" id="{D1D21CF0-AEBF-431A-B7B3-250145EF0BAE}"/>
+              </a:ext>
+            </a:extLst>
+          </p:cNvPr>
+          <p:cNvSpPr txBox="1"/>
+          <p:nvPr/>
+        </p:nvSpPr>
+        <p:spPr>
+          <a:xfrm>
+            <a:off x="6480045" y="5208102"/>
+            <a:ext cx="4542182" cy="369332"/>
+          </a:xfrm>
+          <a:prstGeom prst="rect">
+            <a:avLst/>
+          </a:prstGeom>
+          <a:noFill/>
+        </p:spPr>
+        <p:txBody>
+          <a:bodyPr wrap="square" rtlCol="0">
+            <a:spAutoFit/>
+          </a:bodyPr>
+          <a:lstStyle/>
+          <a:p>
+            <a:r>
+              <a:rPr lang="en-US" dirty="0"/>
+              <a:t>4. Words associated with atmosphere of hotels</a:t>
+            </a:r>
+          </a:p>
+        </p:txBody>
+      </p:sp>
+      <p:sp>
+        <p:nvSpPr>
+          <p:cNvPr id="26" name="TextBox 25">
+            <a:extLst>
+              <a:ext uri="{FF2B5EF4-FFF2-40B4-BE49-F238E27FC236}">
+                <a16:creationId xmlns:a16="http://schemas.microsoft.com/office/drawing/2014/main" id="{8FAE4647-5ED4-44E3-8599-AA0AA4109DC2}"/>
+              </a:ext>
+            </a:extLst>
+          </p:cNvPr>
+          <p:cNvSpPr txBox="1"/>
+          <p:nvPr/>
+        </p:nvSpPr>
+        <p:spPr>
+          <a:xfrm>
+            <a:off x="6818242" y="1649898"/>
+            <a:ext cx="4926227" cy="1200329"/>
+          </a:xfrm>
+          <a:prstGeom prst="rect">
+            <a:avLst/>
+          </a:prstGeom>
+          <a:noFill/>
+        </p:spPr>
+        <p:txBody>
+          <a:bodyPr wrap="square" rtlCol="0">
+            <a:spAutoFit/>
+          </a:bodyPr>
+          <a:lstStyle/>
+          <a:p>
+            <a:r>
+              <a:rPr lang="en-US" dirty="0"/>
+              <a:t>Staff, service, manager, reservation, breakfast, coffee, drink, price, suite, bed, desk, </a:t>
+            </a:r>
+            <a:r>
+              <a:rPr lang="en-US" dirty="0" err="1"/>
+              <a:t>wifi</a:t>
+            </a:r>
+            <a:r>
+              <a:rPr lang="en-US" dirty="0"/>
+              <a:t>, tv, fridge, pillow, towel, booked, food, microwave, dinner, money, fruit, buffet, beer</a:t>
+            </a:r>
+          </a:p>
+        </p:txBody>
+      </p:sp>
+      <p:sp>
+        <p:nvSpPr>
+          <p:cNvPr id="27" name="TextBox 26">
+            <a:extLst>
+              <a:ext uri="{FF2B5EF4-FFF2-40B4-BE49-F238E27FC236}">
+                <a16:creationId xmlns:a16="http://schemas.microsoft.com/office/drawing/2014/main" id="{C924AF83-926D-4DA7-B41B-48A3ECFE0F16}"/>
+              </a:ext>
+            </a:extLst>
+          </p:cNvPr>
+          <p:cNvSpPr txBox="1"/>
+          <p:nvPr/>
+        </p:nvSpPr>
+        <p:spPr>
+          <a:xfrm>
+            <a:off x="6818242" y="3273612"/>
+            <a:ext cx="4926227" cy="923330"/>
+          </a:xfrm>
+          <a:prstGeom prst="rect">
+            <a:avLst/>
+          </a:prstGeom>
+          <a:noFill/>
+        </p:spPr>
+        <p:txBody>
+          <a:bodyPr wrap="square" rtlCol="0">
+            <a:spAutoFit/>
+          </a:bodyPr>
+          <a:lstStyle/>
+          <a:p>
+            <a:r>
+              <a:rPr lang="en-US" dirty="0"/>
+              <a:t>Room, bathroom, pool, tub, shower, lobby, elevator, wall, parking, gym, amenity, size, light, car</a:t>
+            </a:r>
+          </a:p>
+        </p:txBody>
+      </p:sp>
+      <p:sp>
+        <p:nvSpPr>
+          <p:cNvPr id="28" name="TextBox 27">
+            <a:extLst>
+              <a:ext uri="{FF2B5EF4-FFF2-40B4-BE49-F238E27FC236}">
+                <a16:creationId xmlns:a16="http://schemas.microsoft.com/office/drawing/2014/main" id="{AB4AD9B7-A2DB-434E-8DD7-98C0C3063B0B}"/>
+              </a:ext>
+            </a:extLst>
+          </p:cNvPr>
+          <p:cNvSpPr txBox="1"/>
+          <p:nvPr/>
+        </p:nvSpPr>
+        <p:spPr>
+          <a:xfrm>
+            <a:off x="6818242" y="4534312"/>
+            <a:ext cx="4926227" cy="646331"/>
+          </a:xfrm>
+          <a:prstGeom prst="rect">
+            <a:avLst/>
+          </a:prstGeom>
+          <a:noFill/>
+        </p:spPr>
+        <p:txBody>
+          <a:bodyPr wrap="square" rtlCol="0">
+            <a:spAutoFit/>
+          </a:bodyPr>
+          <a:lstStyle/>
+          <a:p>
+            <a:r>
+              <a:rPr lang="en-US" dirty="0"/>
+              <a:t>Shuttle, downtown, airport, distance, bar, location, restaurant, park, near, club</a:t>
+            </a:r>
+          </a:p>
+        </p:txBody>
+      </p:sp>
+      <p:sp>
+        <p:nvSpPr>
+          <p:cNvPr id="29" name="TextBox 28">
+            <a:extLst>
+              <a:ext uri="{FF2B5EF4-FFF2-40B4-BE49-F238E27FC236}">
+                <a16:creationId xmlns:a16="http://schemas.microsoft.com/office/drawing/2014/main" id="{FEACDEF4-A496-470B-B3C7-ACC58C934482}"/>
+              </a:ext>
+            </a:extLst>
+          </p:cNvPr>
+          <p:cNvSpPr txBox="1"/>
+          <p:nvPr/>
+        </p:nvSpPr>
+        <p:spPr>
+          <a:xfrm>
+            <a:off x="6818242" y="5629864"/>
+            <a:ext cx="4926227" cy="923330"/>
+          </a:xfrm>
+          <a:prstGeom prst="rect">
+            <a:avLst/>
+          </a:prstGeom>
+          <a:noFill/>
+        </p:spPr>
+        <p:txBody>
+          <a:bodyPr wrap="square" rtlCol="0">
+            <a:spAutoFit/>
+          </a:bodyPr>
+          <a:lstStyle/>
+          <a:p>
+            <a:r>
+              <a:rPr lang="en-US" dirty="0"/>
+              <a:t>Family, kid, business, clean, comfortable, small, pretty, quiet, beautiful, spacious, modern, noise, smell, comfy, week, weekend, dirty</a:t>
+            </a:r>
+          </a:p>
+        </p:txBody>
+      </p:sp>
+    </p:spTree>
+    <p:extLst>
+      <p:ext uri="{BB962C8B-B14F-4D97-AF65-F5344CB8AC3E}">
+        <p14:creationId xmlns:p14="http://schemas.microsoft.com/office/powerpoint/2010/main" val="349986134"/>
+      </p:ext>
+    </p:extLst>
+  </p:cSld>
+  <p:clrMapOvr>
+    <a:masterClrMapping/>
+  </p:clrMapOvr>
+</p:sld>
+</file>
+
+<file path=ppt/slides/slide8.xml><?xml version="1.0" encoding="utf-8"?>
+<p:sld xmlns:a="http://schemas.openxmlformats.org/drawingml/2006/main" xmlns:r="http://schemas.openxmlformats.org/officeDocument/2006/relationships" xmlns:p="http://schemas.openxmlformats.org/presentationml/2006/main">
+  <p:cSld>
+    <p:spTree>
+      <p:nvGrpSpPr>
+        <p:cNvPr id="1" name=""/>
+        <p:cNvGrpSpPr/>
+        <p:nvPr/>
+      </p:nvGrpSpPr>
+      <p:grpSpPr>
+        <a:xfrm>
+          <a:off x="0" y="0"/>
+          <a:ext cx="0" cy="0"/>
+          <a:chOff x="0" y="0"/>
+          <a:chExt cx="0" cy="0"/>
+        </a:xfrm>
+      </p:grpSpPr>
+      <p:sp>
+        <p:nvSpPr>
+          <p:cNvPr id="2" name="Title 1">
+            <a:extLst>
+              <a:ext uri="{FF2B5EF4-FFF2-40B4-BE49-F238E27FC236}">
+                <a16:creationId xmlns:a16="http://schemas.microsoft.com/office/drawing/2014/main" id="{417E78FE-553A-426A-9575-6CD0E7C8D12E}"/>
+              </a:ext>
+            </a:extLst>
+          </p:cNvPr>
+          <p:cNvSpPr>
+            <a:spLocks noGrp="1"/>
+          </p:cNvSpPr>
+          <p:nvPr>
+            <p:ph type="title"/>
+          </p:nvPr>
+        </p:nvSpPr>
+        <p:spPr/>
+        <p:txBody>
+          <a:bodyPr>
+            <a:normAutofit/>
+          </a:bodyPr>
+          <a:lstStyle/>
+          <a:p>
+            <a:r>
+              <a:rPr lang="en-US" sz="3600" dirty="0"/>
+              <a:t>Data Analysis Process (EDA)</a:t>
+            </a:r>
+          </a:p>
+        </p:txBody>
+      </p:sp>
+      <p:sp>
+        <p:nvSpPr>
+          <p:cNvPr id="22" name="TextBox 21">
+            <a:extLst>
+              <a:ext uri="{FF2B5EF4-FFF2-40B4-BE49-F238E27FC236}">
+                <a16:creationId xmlns:a16="http://schemas.microsoft.com/office/drawing/2014/main" id="{6BE5B367-108E-4F3D-BF48-E78804C14058}"/>
+              </a:ext>
+            </a:extLst>
+          </p:cNvPr>
+          <p:cNvSpPr txBox="1"/>
+          <p:nvPr/>
+        </p:nvSpPr>
+        <p:spPr>
+          <a:xfrm>
+            <a:off x="831578" y="1320353"/>
+            <a:ext cx="4542181" cy="369332"/>
+          </a:xfrm>
+          <a:prstGeom prst="rect">
+            <a:avLst/>
+          </a:prstGeom>
+          <a:noFill/>
+        </p:spPr>
+        <p:txBody>
+          <a:bodyPr wrap="square" rtlCol="0">
+            <a:spAutoFit/>
+          </a:bodyPr>
+          <a:lstStyle/>
+          <a:p>
+            <a:r>
+              <a:rPr lang="en-US" dirty="0"/>
+              <a:t>1. Words associated with service and furniture</a:t>
+            </a:r>
+          </a:p>
+        </p:txBody>
+      </p:sp>
+      <p:sp>
+        <p:nvSpPr>
+          <p:cNvPr id="23" name="TextBox 22">
+            <a:extLst>
+              <a:ext uri="{FF2B5EF4-FFF2-40B4-BE49-F238E27FC236}">
+                <a16:creationId xmlns:a16="http://schemas.microsoft.com/office/drawing/2014/main" id="{600D631E-83FD-44B9-8A55-C4E2B03F3B26}"/>
+              </a:ext>
+            </a:extLst>
+          </p:cNvPr>
+          <p:cNvSpPr txBox="1"/>
+          <p:nvPr/>
+        </p:nvSpPr>
+        <p:spPr>
+          <a:xfrm>
+            <a:off x="6480045" y="2878139"/>
+            <a:ext cx="3577818" cy="369332"/>
+          </a:xfrm>
+          <a:prstGeom prst="rect">
+            <a:avLst/>
+          </a:prstGeom>
+          <a:noFill/>
+        </p:spPr>
+        <p:txBody>
+          <a:bodyPr wrap="square" rtlCol="0">
+            <a:spAutoFit/>
+          </a:bodyPr>
+          <a:lstStyle/>
+          <a:p>
+            <a:r>
+              <a:rPr lang="en-US" dirty="0"/>
+              <a:t>2. Words associated with facility</a:t>
+            </a:r>
+          </a:p>
+        </p:txBody>
+      </p:sp>
+      <p:sp>
+        <p:nvSpPr>
+          <p:cNvPr id="24" name="TextBox 23">
+            <a:extLst>
+              <a:ext uri="{FF2B5EF4-FFF2-40B4-BE49-F238E27FC236}">
+                <a16:creationId xmlns:a16="http://schemas.microsoft.com/office/drawing/2014/main" id="{CA75F733-33E9-49E0-87F1-2AB4E5D66952}"/>
+              </a:ext>
+            </a:extLst>
+          </p:cNvPr>
+          <p:cNvSpPr txBox="1"/>
+          <p:nvPr/>
+        </p:nvSpPr>
+        <p:spPr>
+          <a:xfrm>
+            <a:off x="6480045" y="4223083"/>
+            <a:ext cx="3577818" cy="369332"/>
+          </a:xfrm>
+          <a:prstGeom prst="rect">
+            <a:avLst/>
+          </a:prstGeom>
+          <a:noFill/>
+        </p:spPr>
+        <p:txBody>
+          <a:bodyPr wrap="square" rtlCol="0">
+            <a:spAutoFit/>
+          </a:bodyPr>
+          <a:lstStyle/>
+          <a:p>
+            <a:r>
+              <a:rPr lang="en-US" dirty="0"/>
+              <a:t>3. Words associated with location</a:t>
+            </a:r>
+          </a:p>
+        </p:txBody>
+      </p:sp>
+      <p:sp>
+        <p:nvSpPr>
+          <p:cNvPr id="25" name="TextBox 24">
+            <a:extLst>
+              <a:ext uri="{FF2B5EF4-FFF2-40B4-BE49-F238E27FC236}">
+                <a16:creationId xmlns:a16="http://schemas.microsoft.com/office/drawing/2014/main" id="{D1D21CF0-AEBF-431A-B7B3-250145EF0BAE}"/>
+              </a:ext>
+            </a:extLst>
+          </p:cNvPr>
+          <p:cNvSpPr txBox="1"/>
+          <p:nvPr/>
+        </p:nvSpPr>
+        <p:spPr>
+          <a:xfrm>
+            <a:off x="6480045" y="5208102"/>
+            <a:ext cx="4542182" cy="369332"/>
+          </a:xfrm>
+          <a:prstGeom prst="rect">
+            <a:avLst/>
+          </a:prstGeom>
+          <a:noFill/>
+        </p:spPr>
+        <p:txBody>
+          <a:bodyPr wrap="square" rtlCol="0">
+            <a:spAutoFit/>
+          </a:bodyPr>
+          <a:lstStyle/>
+          <a:p>
+            <a:r>
+              <a:rPr lang="en-US" dirty="0"/>
+              <a:t>4. Words associated with atmosphere of hotels</a:t>
+            </a:r>
+          </a:p>
+        </p:txBody>
+      </p:sp>
+      <p:sp>
+        <p:nvSpPr>
+          <p:cNvPr id="26" name="TextBox 25">
+            <a:extLst>
+              <a:ext uri="{FF2B5EF4-FFF2-40B4-BE49-F238E27FC236}">
+                <a16:creationId xmlns:a16="http://schemas.microsoft.com/office/drawing/2014/main" id="{8FAE4647-5ED4-44E3-8599-AA0AA4109DC2}"/>
+              </a:ext>
+            </a:extLst>
+          </p:cNvPr>
+          <p:cNvSpPr txBox="1"/>
+          <p:nvPr/>
+        </p:nvSpPr>
+        <p:spPr>
+          <a:xfrm>
+            <a:off x="974439" y="1649898"/>
+            <a:ext cx="4926227" cy="1200329"/>
+          </a:xfrm>
+          <a:prstGeom prst="rect">
+            <a:avLst/>
+          </a:prstGeom>
+          <a:noFill/>
+        </p:spPr>
+        <p:txBody>
+          <a:bodyPr wrap="square" rtlCol="0">
+            <a:spAutoFit/>
+          </a:bodyPr>
+          <a:lstStyle/>
+          <a:p>
+            <a:r>
+              <a:rPr lang="en-US" dirty="0"/>
+              <a:t>Staff, service, manager, reservation, breakfast, coffee, drink, price, suite, bed, desk, </a:t>
+            </a:r>
+            <a:r>
+              <a:rPr lang="en-US" dirty="0" err="1"/>
+              <a:t>wifi</a:t>
+            </a:r>
+            <a:r>
+              <a:rPr lang="en-US" dirty="0"/>
+              <a:t>, tv, fridge, pillow, towel, booked, food, microwave, dinner, money, fruit, buffet, beer</a:t>
+            </a:r>
+          </a:p>
+        </p:txBody>
+      </p:sp>
+      <p:sp>
+        <p:nvSpPr>
+          <p:cNvPr id="27" name="TextBox 26">
+            <a:extLst>
+              <a:ext uri="{FF2B5EF4-FFF2-40B4-BE49-F238E27FC236}">
+                <a16:creationId xmlns:a16="http://schemas.microsoft.com/office/drawing/2014/main" id="{C924AF83-926D-4DA7-B41B-48A3ECFE0F16}"/>
+              </a:ext>
+            </a:extLst>
+          </p:cNvPr>
+          <p:cNvSpPr txBox="1"/>
+          <p:nvPr/>
+        </p:nvSpPr>
+        <p:spPr>
+          <a:xfrm>
+            <a:off x="6818242" y="3273612"/>
+            <a:ext cx="4926227" cy="923330"/>
+          </a:xfrm>
+          <a:prstGeom prst="rect">
+            <a:avLst/>
+          </a:prstGeom>
+          <a:noFill/>
+        </p:spPr>
+        <p:txBody>
+          <a:bodyPr wrap="square" rtlCol="0">
+            <a:spAutoFit/>
+          </a:bodyPr>
+          <a:lstStyle/>
+          <a:p>
+            <a:r>
+              <a:rPr lang="en-US" dirty="0"/>
+              <a:t>Room, bathroom, pool, tub, shower, lobby, elevator, wall, parking, gym, amenity, size, light, car</a:t>
+            </a:r>
+          </a:p>
+        </p:txBody>
+      </p:sp>
+      <p:sp>
+        <p:nvSpPr>
+          <p:cNvPr id="28" name="TextBox 27">
+            <a:extLst>
+              <a:ext uri="{FF2B5EF4-FFF2-40B4-BE49-F238E27FC236}">
+                <a16:creationId xmlns:a16="http://schemas.microsoft.com/office/drawing/2014/main" id="{AB4AD9B7-A2DB-434E-8DD7-98C0C3063B0B}"/>
+              </a:ext>
+            </a:extLst>
+          </p:cNvPr>
+          <p:cNvSpPr txBox="1"/>
+          <p:nvPr/>
+        </p:nvSpPr>
+        <p:spPr>
+          <a:xfrm>
+            <a:off x="6818242" y="4534312"/>
+            <a:ext cx="4926227" cy="646331"/>
+          </a:xfrm>
+          <a:prstGeom prst="rect">
+            <a:avLst/>
+          </a:prstGeom>
+          <a:noFill/>
+        </p:spPr>
+        <p:txBody>
+          <a:bodyPr wrap="square" rtlCol="0">
+            <a:spAutoFit/>
+          </a:bodyPr>
+          <a:lstStyle/>
+          <a:p>
+            <a:r>
+              <a:rPr lang="en-US" dirty="0"/>
+              <a:t>Shuttle, downtown, airport, distance, bar, location, restaurant, park, near, club</a:t>
+            </a:r>
+          </a:p>
+        </p:txBody>
+      </p:sp>
+      <p:sp>
+        <p:nvSpPr>
+          <p:cNvPr id="29" name="TextBox 28">
+            <a:extLst>
+              <a:ext uri="{FF2B5EF4-FFF2-40B4-BE49-F238E27FC236}">
+                <a16:creationId xmlns:a16="http://schemas.microsoft.com/office/drawing/2014/main" id="{FEACDEF4-A496-470B-B3C7-ACC58C934482}"/>
+              </a:ext>
+            </a:extLst>
+          </p:cNvPr>
+          <p:cNvSpPr txBox="1"/>
+          <p:nvPr/>
+        </p:nvSpPr>
+        <p:spPr>
+          <a:xfrm>
+            <a:off x="6818242" y="5629864"/>
+            <a:ext cx="4926227" cy="923330"/>
+          </a:xfrm>
+          <a:prstGeom prst="rect">
+            <a:avLst/>
+          </a:prstGeom>
+          <a:noFill/>
+        </p:spPr>
+        <p:txBody>
+          <a:bodyPr wrap="square" rtlCol="0">
+            <a:spAutoFit/>
+          </a:bodyPr>
+          <a:lstStyle/>
+          <a:p>
+            <a:r>
+              <a:rPr lang="en-US" dirty="0"/>
+              <a:t>Family, kid, business, clean, comfortable, small, pretty, quiet, beautiful, spacious, modern, noise, smell, comfy, week, weekend, dirty</a:t>
+            </a:r>
+          </a:p>
+        </p:txBody>
+      </p:sp>
+      <p:pic>
+        <p:nvPicPr>
+          <p:cNvPr id="4" name="Picture 3">
+            <a:extLst>
+              <a:ext uri="{FF2B5EF4-FFF2-40B4-BE49-F238E27FC236}">
+                <a16:creationId xmlns:a16="http://schemas.microsoft.com/office/drawing/2014/main" id="{C6E0EFEB-E1E0-4C88-88FB-DA851246A602}"/>
+              </a:ext>
+            </a:extLst>
+          </p:cNvPr>
+          <p:cNvPicPr>
+            <a:picLocks noChangeAspect="1"/>
+          </p:cNvPicPr>
+          <p:nvPr/>
+        </p:nvPicPr>
+        <p:blipFill>
+          <a:blip r:embed="rId2"/>
+          <a:stretch>
+            <a:fillRect/>
+          </a:stretch>
+        </p:blipFill>
+        <p:spPr>
+          <a:xfrm>
+            <a:off x="838200" y="3002123"/>
+            <a:ext cx="3218072" cy="3248648"/>
+          </a:xfrm>
+          <a:prstGeom prst="rect">
+            <a:avLst/>
+          </a:prstGeom>
+        </p:spPr>
+      </p:pic>
+    </p:spTree>
+    <p:extLst>
+      <p:ext uri="{BB962C8B-B14F-4D97-AF65-F5344CB8AC3E}">
+        <p14:creationId xmlns:p14="http://schemas.microsoft.com/office/powerpoint/2010/main" val="233070103"/>
       </p:ext>
     </p:extLst>
   </p:cSld>

</xml_diff>

<commit_message>
adding more contents in ExecSummary
</commit_message>
<xml_diff>
--- a/Hotels in Madison Area.pptx
+++ b/Hotels in Madison Area.pptx
@@ -326,7 +326,7 @@
           <a:p>
             <a:fld id="{39193EF1-A1E4-453A-86BD-07CAD0B0C234}" type="datetimeFigureOut">
               <a:rPr lang="en-US" smtClean="0"/>
-              <a:t>11/27/2020</a:t>
+              <a:t>11/28/2020</a:t>
             </a:fld>
             <a:endParaRPr lang="en-US"/>
           </a:p>
@@ -496,7 +496,7 @@
           <a:p>
             <a:fld id="{39193EF1-A1E4-453A-86BD-07CAD0B0C234}" type="datetimeFigureOut">
               <a:rPr lang="en-US" smtClean="0"/>
-              <a:t>11/27/2020</a:t>
+              <a:t>11/28/2020</a:t>
             </a:fld>
             <a:endParaRPr lang="en-US"/>
           </a:p>
@@ -719,7 +719,7 @@
           <a:p>
             <a:fld id="{39193EF1-A1E4-453A-86BD-07CAD0B0C234}" type="datetimeFigureOut">
               <a:rPr lang="en-US" smtClean="0"/>
-              <a:t>11/27/2020</a:t>
+              <a:t>11/28/2020</a:t>
             </a:fld>
             <a:endParaRPr lang="en-US"/>
           </a:p>
@@ -899,7 +899,7 @@
           <a:p>
             <a:fld id="{39193EF1-A1E4-453A-86BD-07CAD0B0C234}" type="datetimeFigureOut">
               <a:rPr lang="en-US" smtClean="0"/>
-              <a:t>11/27/2020</a:t>
+              <a:t>11/28/2020</a:t>
             </a:fld>
             <a:endParaRPr lang="en-US"/>
           </a:p>
@@ -1205,7 +1205,7 @@
           <a:p>
             <a:fld id="{39193EF1-A1E4-453A-86BD-07CAD0B0C234}" type="datetimeFigureOut">
               <a:rPr lang="en-US" smtClean="0"/>
-              <a:t>11/27/2020</a:t>
+              <a:t>11/28/2020</a:t>
             </a:fld>
             <a:endParaRPr lang="en-US"/>
           </a:p>
@@ -1509,7 +1509,7 @@
           <a:p>
             <a:fld id="{39193EF1-A1E4-453A-86BD-07CAD0B0C234}" type="datetimeFigureOut">
               <a:rPr lang="en-US" smtClean="0"/>
-              <a:t>11/27/2020</a:t>
+              <a:t>11/28/2020</a:t>
             </a:fld>
             <a:endParaRPr lang="en-US"/>
           </a:p>
@@ -1931,7 +1931,7 @@
           <a:p>
             <a:fld id="{39193EF1-A1E4-453A-86BD-07CAD0B0C234}" type="datetimeFigureOut">
               <a:rPr lang="en-US" smtClean="0"/>
-              <a:t>11/27/2020</a:t>
+              <a:t>11/28/2020</a:t>
             </a:fld>
             <a:endParaRPr lang="en-US"/>
           </a:p>
@@ -2049,7 +2049,7 @@
           <a:p>
             <a:fld id="{39193EF1-A1E4-453A-86BD-07CAD0B0C234}" type="datetimeFigureOut">
               <a:rPr lang="en-US" smtClean="0"/>
-              <a:t>11/27/2020</a:t>
+              <a:t>11/28/2020</a:t>
             </a:fld>
             <a:endParaRPr lang="en-US"/>
           </a:p>
@@ -2144,7 +2144,7 @@
           <a:p>
             <a:fld id="{39193EF1-A1E4-453A-86BD-07CAD0B0C234}" type="datetimeFigureOut">
               <a:rPr lang="en-US" smtClean="0"/>
-              <a:t>11/27/2020</a:t>
+              <a:t>11/28/2020</a:t>
             </a:fld>
             <a:endParaRPr lang="en-US"/>
           </a:p>
@@ -2417,7 +2417,7 @@
           <a:p>
             <a:fld id="{39193EF1-A1E4-453A-86BD-07CAD0B0C234}" type="datetimeFigureOut">
               <a:rPr lang="en-US" smtClean="0"/>
-              <a:t>11/27/2020</a:t>
+              <a:t>11/28/2020</a:t>
             </a:fld>
             <a:endParaRPr lang="en-US"/>
           </a:p>
@@ -2682,7 +2682,7 @@
           <a:p>
             <a:fld id="{39193EF1-A1E4-453A-86BD-07CAD0B0C234}" type="datetimeFigureOut">
               <a:rPr lang="en-US" smtClean="0"/>
-              <a:t>11/27/2020</a:t>
+              <a:t>11/28/2020</a:t>
             </a:fld>
             <a:endParaRPr lang="en-US"/>
           </a:p>
@@ -2931,7 +2931,7 @@
           <a:p>
             <a:fld id="{39193EF1-A1E4-453A-86BD-07CAD0B0C234}" type="datetimeFigureOut">
               <a:rPr lang="en-US" smtClean="0"/>
-              <a:t>11/27/2020</a:t>
+              <a:t>11/28/2020</a:t>
             </a:fld>
             <a:endParaRPr lang="en-US"/>
           </a:p>
@@ -6426,7 +6426,7 @@
             </a:pPr>
             <a:r>
               <a:rPr lang="en-US" dirty="0"/>
-              <a:t>Select out the categories that contains hotels</a:t>
+              <a:t>Select out the row according to the categories that contains hotels</a:t>
             </a:r>
           </a:p>
           <a:p>
@@ -6436,7 +6436,7 @@
             </a:pPr>
             <a:r>
               <a:rPr lang="en-US" dirty="0"/>
-              <a:t>Select out the business name that contains hotel, inn, Hilton, Courtyard, Edge, Place, Graduate, Wyndham, Suites, Motel, Lodge</a:t>
+              <a:t>Select out the row according to the business name that contains hotel, inn, Hilton, Courtyard, Edge, Place, Graduate, Wyndham, Suites, Motel, Lodge</a:t>
             </a:r>
           </a:p>
           <a:p>
@@ -8222,7 +8222,7 @@
             </a:pPr>
             <a:r>
               <a:rPr lang="en-US" dirty="0"/>
-              <a:t>Drop all columns except rated star, review text, name, address, postal code, average a, attributes of business, categories of business.</a:t>
+              <a:t>Drop all columns except rated star, review text, name, address, postal code, average rates, attributes of businesses, categories of business.</a:t>
             </a:r>
           </a:p>
           <a:p>
@@ -8232,7 +8232,7 @@
             </a:pPr>
             <a:r>
               <a:rPr lang="en-US" dirty="0"/>
-              <a:t>Break the review text into word by word and get rid of stop words and special characters make it into matrix form.</a:t>
+              <a:t>Break the review text into word by word, get rid of stop words and special characters and make it into matrix form.</a:t>
             </a:r>
           </a:p>
           <a:p>
@@ -9024,7 +9024,7 @@
           <a:p>
             <a:r>
               <a:rPr lang="en-US" dirty="0"/>
-              <a:t>Second, we removed unmeaningful words, by selected out the words more used than 3</a:t>
+              <a:t>Second, we excluded unmeaningful words, by selecting out the words more used than 3</a:t>
             </a:r>
             <a:r>
               <a:rPr lang="en-US" baseline="30000" dirty="0"/>
@@ -9032,7 +9032,7 @@
             </a:r>
             <a:r>
               <a:rPr lang="en-US" dirty="0"/>
-              <a:t> quantile(53.00)reduced the repeated count to 1 </a:t>
+              <a:t> quantile(53.00)</a:t>
             </a:r>
           </a:p>
         </p:txBody>

</xml_diff>